<commit_message>
Its late but I finally got my easy tables working
</commit_message>
<xml_diff>
--- a/MSA Assessment Deck.pptx
+++ b/MSA Assessment Deck.pptx
@@ -5,18 +5,19 @@
     <p:sldMasterId id="2147483648" r:id="rId1"/>
   </p:sldMasterIdLst>
   <p:notesMasterIdLst>
-    <p:notesMasterId r:id="rId11"/>
+    <p:notesMasterId r:id="rId12"/>
   </p:notesMasterIdLst>
   <p:sldIdLst>
     <p:sldId id="256" r:id="rId2"/>
     <p:sldId id="257" r:id="rId3"/>
-    <p:sldId id="263" r:id="rId4"/>
-    <p:sldId id="258" r:id="rId5"/>
-    <p:sldId id="265" r:id="rId6"/>
-    <p:sldId id="260" r:id="rId7"/>
-    <p:sldId id="261" r:id="rId8"/>
-    <p:sldId id="264" r:id="rId9"/>
-    <p:sldId id="262" r:id="rId10"/>
+    <p:sldId id="266" r:id="rId4"/>
+    <p:sldId id="263" r:id="rId5"/>
+    <p:sldId id="258" r:id="rId6"/>
+    <p:sldId id="265" r:id="rId7"/>
+    <p:sldId id="260" r:id="rId8"/>
+    <p:sldId id="261" r:id="rId9"/>
+    <p:sldId id="264" r:id="rId10"/>
+    <p:sldId id="262" r:id="rId11"/>
   </p:sldIdLst>
   <p:sldSz cx="12192000" cy="6858000"/>
   <p:notesSz cx="6858000" cy="9144000"/>
@@ -117,7 +118,7 @@
   </p:defaultTextStyle>
   <p:extLst>
     <p:ext uri="{EFAFB233-063F-42B5-8137-9DF3F51BA10A}">
-      <p15:sldGuideLst xmlns:p15="http://schemas.microsoft.com/office/powerpoint/2012/main" xmlns=""/>
+      <p15:sldGuideLst xmlns="" xmlns:p15="http://schemas.microsoft.com/office/powerpoint/2012/main"/>
     </p:ext>
   </p:extLst>
 </p:presentation>
@@ -374,7 +375,7 @@
     </p:spTree>
     <p:extLst>
       <p:ext uri="{BB962C8B-B14F-4D97-AF65-F5344CB8AC3E}">
-        <p14:creationId xmlns:p14="http://schemas.microsoft.com/office/powerpoint/2010/main" xmlns="" val="3301106360"/>
+        <p14:creationId xmlns="" xmlns:p14="http://schemas.microsoft.com/office/powerpoint/2010/main" val="3301106360"/>
       </p:ext>
     </p:extLst>
   </p:cSld>
@@ -557,7 +558,100 @@
     </p:spTree>
     <p:extLst>
       <p:ext uri="{BB962C8B-B14F-4D97-AF65-F5344CB8AC3E}">
-        <p14:creationId xmlns:p14="http://schemas.microsoft.com/office/powerpoint/2010/main" xmlns="" val="2472671931"/>
+        <p14:creationId xmlns="" xmlns:p14="http://schemas.microsoft.com/office/powerpoint/2010/main" val="2472671931"/>
+      </p:ext>
+    </p:extLst>
+  </p:cSld>
+  <p:clrMapOvr>
+    <a:masterClrMapping/>
+  </p:clrMapOvr>
+</p:notes>
+</file>
+
+<file path=ppt/notesSlides/notesSlide10.xml><?xml version="1.0" encoding="utf-8"?>
+<p:notes xmlns:a="http://schemas.openxmlformats.org/drawingml/2006/main" xmlns:r="http://schemas.openxmlformats.org/officeDocument/2006/relationships" xmlns:p="http://schemas.openxmlformats.org/presentationml/2006/main">
+  <p:cSld>
+    <p:spTree>
+      <p:nvGrpSpPr>
+        <p:cNvPr id="1" name=""/>
+        <p:cNvGrpSpPr/>
+        <p:nvPr/>
+      </p:nvGrpSpPr>
+      <p:grpSpPr>
+        <a:xfrm>
+          <a:off x="0" y="0"/>
+          <a:ext cx="0" cy="0"/>
+          <a:chOff x="0" y="0"/>
+          <a:chExt cx="0" cy="0"/>
+        </a:xfrm>
+      </p:grpSpPr>
+      <p:sp>
+        <p:nvSpPr>
+          <p:cNvPr id="2" name="Slide Image Placeholder 1"/>
+          <p:cNvSpPr>
+            <a:spLocks noGrp="1" noRot="1" noChangeAspect="1"/>
+          </p:cNvSpPr>
+          <p:nvPr>
+            <p:ph type="sldImg"/>
+          </p:nvPr>
+        </p:nvSpPr>
+        <p:spPr/>
+      </p:sp>
+      <p:sp>
+        <p:nvSpPr>
+          <p:cNvPr id="3" name="Notes Placeholder 2"/>
+          <p:cNvSpPr>
+            <a:spLocks noGrp="1"/>
+          </p:cNvSpPr>
+          <p:nvPr>
+            <p:ph type="body" idx="1"/>
+          </p:nvPr>
+        </p:nvSpPr>
+        <p:spPr/>
+        <p:txBody>
+          <a:bodyPr/>
+          <a:lstStyle/>
+          <a:p>
+            <a:r>
+              <a:rPr lang="en-US" dirty="0"/>
+              <a:t>Any final</a:t>
+            </a:r>
+            <a:r>
+              <a:rPr lang="en-US" baseline="0" dirty="0"/>
+              <a:t> things you want to tell us</a:t>
+            </a:r>
+            <a:endParaRPr lang="en-US" dirty="0"/>
+          </a:p>
+        </p:txBody>
+      </p:sp>
+      <p:sp>
+        <p:nvSpPr>
+          <p:cNvPr id="4" name="Slide Number Placeholder 3"/>
+          <p:cNvSpPr>
+            <a:spLocks noGrp="1"/>
+          </p:cNvSpPr>
+          <p:nvPr>
+            <p:ph type="sldNum" sz="quarter" idx="10"/>
+          </p:nvPr>
+        </p:nvSpPr>
+        <p:spPr/>
+        <p:txBody>
+          <a:bodyPr/>
+          <a:lstStyle/>
+          <a:p>
+            <a:fld id="{A008DDF4-253B-4E36-BE28-46B8E6426B7B}" type="slidenum">
+              <a:rPr lang="en-US" smtClean="0"/>
+              <a:pPr/>
+              <a:t>10</a:t>
+            </a:fld>
+            <a:endParaRPr lang="en-US"/>
+          </a:p>
+        </p:txBody>
+      </p:sp>
+    </p:spTree>
+    <p:extLst>
+      <p:ext uri="{BB962C8B-B14F-4D97-AF65-F5344CB8AC3E}">
+        <p14:creationId xmlns="" xmlns:p14="http://schemas.microsoft.com/office/powerpoint/2010/main" val="3392905823"/>
       </p:ext>
     </p:extLst>
   </p:cSld>
@@ -656,7 +750,7 @@
     </p:spTree>
     <p:extLst>
       <p:ext uri="{BB962C8B-B14F-4D97-AF65-F5344CB8AC3E}">
-        <p14:creationId xmlns:p14="http://schemas.microsoft.com/office/powerpoint/2010/main" xmlns="" val="3078341078"/>
+        <p14:creationId xmlns="" xmlns:p14="http://schemas.microsoft.com/office/powerpoint/2010/main" val="3078341078"/>
       </p:ext>
     </p:extLst>
   </p:cSld>
@@ -712,8 +806,19 @@
           <a:p>
             <a:r>
               <a:rPr lang="en-US" dirty="0"/>
-              <a:t>User Experience</a:t>
-            </a:r>
+              <a:t>This section is NOT assessed. We just want to get to know</a:t>
+            </a:r>
+            <a:r>
+              <a:rPr lang="en-US" baseline="0" dirty="0"/>
+              <a:t> you </a:t>
+            </a:r>
+            <a:r>
+              <a:rPr lang="en-US" baseline="0" dirty="0">
+                <a:sym typeface="Wingdings" panose="05000000000000000000" pitchFamily="2" charset="2"/>
+              </a:rPr>
+              <a:t>.</a:t>
+            </a:r>
+            <a:endParaRPr lang="en-US" dirty="0"/>
           </a:p>
         </p:txBody>
       </p:sp>
@@ -744,7 +849,7 @@
     </p:spTree>
     <p:extLst>
       <p:ext uri="{BB962C8B-B14F-4D97-AF65-F5344CB8AC3E}">
-        <p14:creationId xmlns:p14="http://schemas.microsoft.com/office/powerpoint/2010/main" xmlns="" val="3826695956"/>
+        <p14:creationId xmlns="" xmlns:p14="http://schemas.microsoft.com/office/powerpoint/2010/main" val="3078341078"/>
       </p:ext>
     </p:extLst>
   </p:cSld>
@@ -800,7 +905,7 @@
           <a:p>
             <a:r>
               <a:rPr lang="en-US" dirty="0"/>
-              <a:t>Talk about your database, what schema you used and what data you used</a:t>
+              <a:t>User Experience</a:t>
             </a:r>
           </a:p>
         </p:txBody>
@@ -832,7 +937,7 @@
     </p:spTree>
     <p:extLst>
       <p:ext uri="{BB962C8B-B14F-4D97-AF65-F5344CB8AC3E}">
-        <p14:creationId xmlns:p14="http://schemas.microsoft.com/office/powerpoint/2010/main" xmlns="" val="2860620212"/>
+        <p14:creationId xmlns="" xmlns:p14="http://schemas.microsoft.com/office/powerpoint/2010/main" val="3826695956"/>
       </p:ext>
     </p:extLst>
   </p:cSld>
@@ -888,13 +993,8 @@
           <a:p>
             <a:r>
               <a:rPr lang="en-US" dirty="0"/>
-              <a:t>Advanced</a:t>
-            </a:r>
-            <a:r>
-              <a:rPr lang="en-US" baseline="0" dirty="0"/>
-              <a:t> features…</a:t>
-            </a:r>
-            <a:endParaRPr lang="en-US" dirty="0"/>
+              <a:t>Talk about your database, what schema you used and what data you used</a:t>
+            </a:r>
           </a:p>
         </p:txBody>
       </p:sp>
@@ -925,7 +1025,7 @@
     </p:spTree>
     <p:extLst>
       <p:ext uri="{BB962C8B-B14F-4D97-AF65-F5344CB8AC3E}">
-        <p14:creationId xmlns:p14="http://schemas.microsoft.com/office/powerpoint/2010/main" xmlns="" val="587569099"/>
+        <p14:creationId xmlns="" xmlns:p14="http://schemas.microsoft.com/office/powerpoint/2010/main" val="2860620212"/>
       </p:ext>
     </p:extLst>
   </p:cSld>
@@ -981,8 +1081,13 @@
           <a:p>
             <a:r>
               <a:rPr lang="en-US" dirty="0"/>
-              <a:t>Explain your Azure features here</a:t>
-            </a:r>
+              <a:t>Advanced</a:t>
+            </a:r>
+            <a:r>
+              <a:rPr lang="en-US" baseline="0" dirty="0"/>
+              <a:t> features…</a:t>
+            </a:r>
+            <a:endParaRPr lang="en-US" dirty="0"/>
           </a:p>
         </p:txBody>
       </p:sp>
@@ -1013,7 +1118,7 @@
     </p:spTree>
     <p:extLst>
       <p:ext uri="{BB962C8B-B14F-4D97-AF65-F5344CB8AC3E}">
-        <p14:creationId xmlns:p14="http://schemas.microsoft.com/office/powerpoint/2010/main" xmlns="" val="3424210924"/>
+        <p14:creationId xmlns="" xmlns:p14="http://schemas.microsoft.com/office/powerpoint/2010/main" val="587569099"/>
       </p:ext>
     </p:extLst>
   </p:cSld>
@@ -1069,13 +1174,8 @@
           <a:p>
             <a:r>
               <a:rPr lang="en-US" dirty="0"/>
-              <a:t>Advanced</a:t>
-            </a:r>
-            <a:r>
-              <a:rPr lang="en-US" baseline="0" dirty="0"/>
-              <a:t> features…</a:t>
-            </a:r>
-            <a:endParaRPr lang="en-US" dirty="0"/>
+              <a:t>Explain your Azure features here</a:t>
+            </a:r>
           </a:p>
         </p:txBody>
       </p:sp>
@@ -1106,7 +1206,7 @@
     </p:spTree>
     <p:extLst>
       <p:ext uri="{BB962C8B-B14F-4D97-AF65-F5344CB8AC3E}">
-        <p14:creationId xmlns:p14="http://schemas.microsoft.com/office/powerpoint/2010/main" xmlns="" val="2146667125"/>
+        <p14:creationId xmlns="" xmlns:p14="http://schemas.microsoft.com/office/powerpoint/2010/main" val="3424210924"/>
       </p:ext>
     </p:extLst>
   </p:cSld>
@@ -1166,7 +1266,7 @@
             </a:r>
             <a:r>
               <a:rPr lang="en-US" baseline="0" dirty="0"/>
-              <a:t> considerations…</a:t>
+              <a:t> features…</a:t>
             </a:r>
             <a:endParaRPr lang="en-US" dirty="0"/>
           </a:p>
@@ -1199,7 +1299,7 @@
     </p:spTree>
     <p:extLst>
       <p:ext uri="{BB962C8B-B14F-4D97-AF65-F5344CB8AC3E}">
-        <p14:creationId xmlns:p14="http://schemas.microsoft.com/office/powerpoint/2010/main" xmlns="" val="65477906"/>
+        <p14:creationId xmlns="" xmlns:p14="http://schemas.microsoft.com/office/powerpoint/2010/main" val="2146667125"/>
       </p:ext>
     </p:extLst>
   </p:cSld>
@@ -1255,11 +1355,11 @@
           <a:p>
             <a:r>
               <a:rPr lang="en-US" dirty="0"/>
-              <a:t>Any final</a:t>
+              <a:t>Advanced</a:t>
             </a:r>
             <a:r>
               <a:rPr lang="en-US" baseline="0" dirty="0"/>
-              <a:t> things you want to tell us</a:t>
+              <a:t> considerations…</a:t>
             </a:r>
             <a:endParaRPr lang="en-US" dirty="0"/>
           </a:p>
@@ -1292,7 +1392,7 @@
     </p:spTree>
     <p:extLst>
       <p:ext uri="{BB962C8B-B14F-4D97-AF65-F5344CB8AC3E}">
-        <p14:creationId xmlns:p14="http://schemas.microsoft.com/office/powerpoint/2010/main" xmlns="" val="3392905823"/>
+        <p14:creationId xmlns="" xmlns:p14="http://schemas.microsoft.com/office/powerpoint/2010/main" val="65477906"/>
       </p:ext>
     </p:extLst>
   </p:cSld>
@@ -1490,7 +1590,7 @@
     </p:spTree>
     <p:extLst>
       <p:ext uri="{BB962C8B-B14F-4D97-AF65-F5344CB8AC3E}">
-        <p14:creationId xmlns:p14="http://schemas.microsoft.com/office/powerpoint/2010/main" xmlns="" val="2874579921"/>
+        <p14:creationId xmlns="" xmlns:p14="http://schemas.microsoft.com/office/powerpoint/2010/main" val="2874579921"/>
       </p:ext>
     </p:extLst>
   </p:cSld>
@@ -1698,7 +1798,7 @@
     </p:spTree>
     <p:extLst>
       <p:ext uri="{BB962C8B-B14F-4D97-AF65-F5344CB8AC3E}">
-        <p14:creationId xmlns:p14="http://schemas.microsoft.com/office/powerpoint/2010/main" xmlns="" val="1920372775"/>
+        <p14:creationId xmlns="" xmlns:p14="http://schemas.microsoft.com/office/powerpoint/2010/main" val="1920372775"/>
       </p:ext>
     </p:extLst>
   </p:cSld>
@@ -1957,7 +2057,7 @@
     </p:spTree>
     <p:extLst>
       <p:ext uri="{BB962C8B-B14F-4D97-AF65-F5344CB8AC3E}">
-        <p14:creationId xmlns:p14="http://schemas.microsoft.com/office/powerpoint/2010/main" xmlns="" val="1700796481"/>
+        <p14:creationId xmlns="" xmlns:p14="http://schemas.microsoft.com/office/powerpoint/2010/main" val="1700796481"/>
       </p:ext>
     </p:extLst>
   </p:cSld>
@@ -2188,7 +2288,7 @@
     </p:spTree>
     <p:extLst>
       <p:ext uri="{BB962C8B-B14F-4D97-AF65-F5344CB8AC3E}">
-        <p14:creationId xmlns:p14="http://schemas.microsoft.com/office/powerpoint/2010/main" xmlns="" val="2311856275"/>
+        <p14:creationId xmlns="" xmlns:p14="http://schemas.microsoft.com/office/powerpoint/2010/main" val="2311856275"/>
       </p:ext>
     </p:extLst>
   </p:cSld>
@@ -2317,7 +2417,7 @@
     </p:spTree>
     <p:extLst>
       <p:ext uri="{BB962C8B-B14F-4D97-AF65-F5344CB8AC3E}">
-        <p14:creationId xmlns:p14="http://schemas.microsoft.com/office/powerpoint/2010/main" xmlns="" val="1478415753"/>
+        <p14:creationId xmlns="" xmlns:p14="http://schemas.microsoft.com/office/powerpoint/2010/main" val="1478415753"/>
       </p:ext>
     </p:extLst>
   </p:cSld>
@@ -2424,7 +2524,7 @@
     </p:spTree>
     <p:extLst>
       <p:ext uri="{BB962C8B-B14F-4D97-AF65-F5344CB8AC3E}">
-        <p14:creationId xmlns:p14="http://schemas.microsoft.com/office/powerpoint/2010/main" xmlns="" val="3489345538"/>
+        <p14:creationId xmlns="" xmlns:p14="http://schemas.microsoft.com/office/powerpoint/2010/main" val="3489345538"/>
       </p:ext>
     </p:extLst>
   </p:cSld>
@@ -2711,7 +2811,7 @@
     </p:spTree>
     <p:extLst>
       <p:ext uri="{BB962C8B-B14F-4D97-AF65-F5344CB8AC3E}">
-        <p14:creationId xmlns:p14="http://schemas.microsoft.com/office/powerpoint/2010/main" xmlns="" val="2661269687"/>
+        <p14:creationId xmlns="" xmlns:p14="http://schemas.microsoft.com/office/powerpoint/2010/main" val="2661269687"/>
       </p:ext>
     </p:extLst>
   </p:cSld>
@@ -2965,7 +3065,7 @@
           <p:cNvPr id="7" name="Rectangle 6">
             <a:extLst>
               <a:ext uri="{FF2B5EF4-FFF2-40B4-BE49-F238E27FC236}">
-                <a16:creationId xmlns:a16="http://schemas.microsoft.com/office/drawing/2014/main" xmlns="" id="{04B4CCE6-4A64-4B17-B79A-DBEE836B49F4}"/>
+                <a16:creationId xmlns="" xmlns:a16="http://schemas.microsoft.com/office/drawing/2014/main" id="{04B4CCE6-4A64-4B17-B79A-DBEE836B49F4}"/>
               </a:ext>
             </a:extLst>
           </p:cNvPr>
@@ -3017,7 +3117,7 @@
           <p:cNvPr id="9" name="Picture 8">
             <a:extLst>
               <a:ext uri="{FF2B5EF4-FFF2-40B4-BE49-F238E27FC236}">
-                <a16:creationId xmlns:a16="http://schemas.microsoft.com/office/drawing/2014/main" xmlns="" id="{B64D312E-500D-437B-B3BC-D1C116C4385F}"/>
+                <a16:creationId xmlns="" xmlns:a16="http://schemas.microsoft.com/office/drawing/2014/main" id="{B64D312E-500D-437B-B3BC-D1C116C4385F}"/>
               </a:ext>
             </a:extLst>
           </p:cNvPr>
@@ -3030,7 +3130,7 @@
           <a:blip r:embed="rId9" cstate="print">
             <a:extLst>
               <a:ext uri="{28A0092B-C50C-407E-A947-70E740481C1C}">
-                <a14:useLocalDpi xmlns:a14="http://schemas.microsoft.com/office/drawing/2010/main" xmlns="" val="0"/>
+                <a14:useLocalDpi xmlns="" xmlns:a14="http://schemas.microsoft.com/office/drawing/2010/main" val="0"/>
               </a:ext>
             </a:extLst>
           </a:blip>
@@ -3053,7 +3153,7 @@
           <p:cNvPr id="10" name="TextBox 9">
             <a:extLst>
               <a:ext uri="{FF2B5EF4-FFF2-40B4-BE49-F238E27FC236}">
-                <a16:creationId xmlns:a16="http://schemas.microsoft.com/office/drawing/2014/main" xmlns="" id="{EC283049-03AB-4647-B58F-EF370055FF9C}"/>
+                <a16:creationId xmlns="" xmlns:a16="http://schemas.microsoft.com/office/drawing/2014/main" id="{EC283049-03AB-4647-B58F-EF370055FF9C}"/>
               </a:ext>
             </a:extLst>
           </p:cNvPr>
@@ -3090,7 +3190,7 @@
     </p:spTree>
     <p:extLst>
       <p:ext uri="{BB962C8B-B14F-4D97-AF65-F5344CB8AC3E}">
-        <p14:creationId xmlns:p14="http://schemas.microsoft.com/office/powerpoint/2010/main" xmlns="" val="3174835670"/>
+        <p14:creationId xmlns="" xmlns:p14="http://schemas.microsoft.com/office/powerpoint/2010/main" val="3174835670"/>
       </p:ext>
     </p:extLst>
   </p:cSld>
@@ -3483,16 +3583,127 @@
           </a:p>
         </p:txBody>
       </p:sp>
+      <p:pic>
+        <p:nvPicPr>
+          <p:cNvPr id="4" name="Picture 3" descr="BankLogo2.png"/>
+          <p:cNvPicPr>
+            <a:picLocks noChangeAspect="1"/>
+          </p:cNvPicPr>
+          <p:nvPr/>
+        </p:nvPicPr>
+        <p:blipFill>
+          <a:blip r:embed="rId3" cstate="print"/>
+          <a:stretch>
+            <a:fillRect/>
+          </a:stretch>
+        </p:blipFill>
+        <p:spPr>
+          <a:xfrm>
+            <a:off x="4793226" y="191729"/>
+            <a:ext cx="2403987" cy="2403987"/>
+          </a:xfrm>
+          <a:prstGeom prst="rect">
+            <a:avLst/>
+          </a:prstGeom>
+        </p:spPr>
+      </p:pic>
     </p:spTree>
     <p:extLst>
       <p:ext uri="{BB962C8B-B14F-4D97-AF65-F5344CB8AC3E}">
-        <p14:creationId xmlns:p14="http://schemas.microsoft.com/office/powerpoint/2010/main" xmlns="" val="1666508604"/>
+        <p14:creationId xmlns="" xmlns:p14="http://schemas.microsoft.com/office/powerpoint/2010/main" val="1666508604"/>
       </p:ext>
     </p:extLst>
   </p:cSld>
   <p:clrMapOvr>
     <a:masterClrMapping/>
   </p:clrMapOvr>
+</p:sld>
+</file>
+
+<file path=ppt/slides/slide10.xml><?xml version="1.0" encoding="utf-8"?>
+<p:sld xmlns:a="http://schemas.openxmlformats.org/drawingml/2006/main" xmlns:r="http://schemas.openxmlformats.org/officeDocument/2006/relationships" xmlns:p="http://schemas.openxmlformats.org/presentationml/2006/main">
+  <p:cSld>
+    <p:spTree>
+      <p:nvGrpSpPr>
+        <p:cNvPr id="1" name=""/>
+        <p:cNvGrpSpPr/>
+        <p:nvPr/>
+      </p:nvGrpSpPr>
+      <p:grpSpPr>
+        <a:xfrm>
+          <a:off x="0" y="0"/>
+          <a:ext cx="0" cy="0"/>
+          <a:chOff x="0" y="0"/>
+          <a:chExt cx="0" cy="0"/>
+        </a:xfrm>
+      </p:grpSpPr>
+      <p:sp>
+        <p:nvSpPr>
+          <p:cNvPr id="2" name="Title 1"/>
+          <p:cNvSpPr>
+            <a:spLocks noGrp="1"/>
+          </p:cNvSpPr>
+          <p:nvPr>
+            <p:ph type="title"/>
+          </p:nvPr>
+        </p:nvSpPr>
+        <p:spPr/>
+        <p:txBody>
+          <a:bodyPr/>
+          <a:lstStyle/>
+          <a:p>
+            <a:r>
+              <a:rPr lang="en-US" dirty="0">
+                <a:latin typeface="Segoe UI Light" panose="020B0502040204020203" pitchFamily="34" charset="0"/>
+                <a:cs typeface="Segoe UI Light" panose="020B0502040204020203" pitchFamily="34" charset="0"/>
+              </a:rPr>
+              <a:t>Final Comments</a:t>
+            </a:r>
+          </a:p>
+        </p:txBody>
+      </p:sp>
+      <p:sp>
+        <p:nvSpPr>
+          <p:cNvPr id="3" name="Subtitle 2"/>
+          <p:cNvSpPr>
+            <a:spLocks noGrp="1"/>
+          </p:cNvSpPr>
+          <p:nvPr>
+            <p:ph idx="1"/>
+          </p:nvPr>
+        </p:nvSpPr>
+        <p:spPr/>
+        <p:txBody>
+          <a:bodyPr/>
+          <a:lstStyle/>
+          <a:p>
+            <a:pPr marL="0" indent="0">
+              <a:buNone/>
+            </a:pPr>
+            <a:endParaRPr lang="en-US" dirty="0">
+              <a:latin typeface="Segoe UI Light" panose="020B0502040204020203" pitchFamily="34" charset="0"/>
+              <a:cs typeface="Segoe UI Light" panose="020B0502040204020203" pitchFamily="34" charset="0"/>
+            </a:endParaRPr>
+          </a:p>
+        </p:txBody>
+      </p:sp>
+    </p:spTree>
+    <p:extLst>
+      <p:ext uri="{BB962C8B-B14F-4D97-AF65-F5344CB8AC3E}">
+        <p14:creationId xmlns="" xmlns:p14="http://schemas.microsoft.com/office/powerpoint/2010/main" val="1095715971"/>
+      </p:ext>
+    </p:extLst>
+  </p:cSld>
+  <p:clrMapOvr>
+    <a:masterClrMapping/>
+  </p:clrMapOvr>
+  <p:timing>
+    <p:tnLst>
+      <p:par>
+        <p:cTn id="1" dur="indefinite" restart="never" nodeType="tmRoot"/>
+      </p:par>
+    </p:tnLst>
+  </p:timing>
 </p:sld>
 </file>
 
@@ -3558,59 +3769,75 @@
           <a:lstStyle/>
           <a:p>
             <a:r>
-              <a:rPr lang="en-US" dirty="0">
+              <a:rPr lang="en-US" dirty="0" smtClean="0"/>
+              <a:t>Computer Science and Commerce</a:t>
+            </a:r>
+          </a:p>
+          <a:p>
+            <a:r>
+              <a:rPr lang="en-US" dirty="0" smtClean="0">
                 <a:latin typeface="Segoe UI Light" panose="020B0502040204020203" pitchFamily="34" charset="0"/>
                 <a:cs typeface="Segoe UI Light" panose="020B0502040204020203" pitchFamily="34" charset="0"/>
               </a:rPr>
-              <a:t>What your interests / hobbies are</a:t>
-            </a:r>
+              <a:t>Hobbies?</a:t>
+            </a:r>
+          </a:p>
+          <a:p>
+            <a:r>
+              <a:rPr lang="en-US" dirty="0" smtClean="0"/>
+              <a:t>I love coding. </a:t>
+            </a:r>
+          </a:p>
+          <a:p>
+            <a:endParaRPr lang="en-US" dirty="0" smtClean="0">
+              <a:latin typeface="Segoe UI Light" panose="020B0502040204020203" pitchFamily="34" charset="0"/>
+              <a:cs typeface="Segoe UI Light" panose="020B0502040204020203" pitchFamily="34" charset="0"/>
+            </a:endParaRPr>
+          </a:p>
+          <a:p>
+            <a:endParaRPr lang="en-US" dirty="0">
+              <a:latin typeface="Segoe UI Light" panose="020B0502040204020203" pitchFamily="34" charset="0"/>
+              <a:cs typeface="Segoe UI Light" panose="020B0502040204020203" pitchFamily="34" charset="0"/>
+            </a:endParaRPr>
           </a:p>
           <a:p>
             <a:pPr algn="l"/>
-            <a:r>
-              <a:rPr lang="en-US" dirty="0">
-                <a:latin typeface="Segoe UI Light" panose="020B0502040204020203" pitchFamily="34" charset="0"/>
-                <a:cs typeface="Segoe UI Light" panose="020B0502040204020203" pitchFamily="34" charset="0"/>
-              </a:rPr>
-              <a:t>What you are studying</a:t>
-            </a:r>
-          </a:p>
-          <a:p>
-            <a:pPr algn="l"/>
-            <a:r>
-              <a:rPr lang="en-US" dirty="0">
-                <a:latin typeface="Segoe UI Light" panose="020B0502040204020203" pitchFamily="34" charset="0"/>
-                <a:cs typeface="Segoe UI Light" panose="020B0502040204020203" pitchFamily="34" charset="0"/>
-              </a:rPr>
-              <a:t>Best part of MSA</a:t>
-            </a:r>
-          </a:p>
-          <a:p>
-            <a:pPr algn="l"/>
-            <a:r>
-              <a:rPr lang="en-US" dirty="0">
-                <a:latin typeface="Segoe UI Light" panose="020B0502040204020203" pitchFamily="34" charset="0"/>
-                <a:cs typeface="Segoe UI Light" panose="020B0502040204020203" pitchFamily="34" charset="0"/>
-              </a:rPr>
-              <a:t>What we could improve</a:t>
-            </a:r>
-          </a:p>
-          <a:p>
-            <a:pPr algn="l"/>
-            <a:r>
-              <a:rPr lang="en-US" dirty="0">
-                <a:latin typeface="Segoe UI Light" panose="020B0502040204020203" pitchFamily="34" charset="0"/>
-                <a:cs typeface="Segoe UI Light" panose="020B0502040204020203" pitchFamily="34" charset="0"/>
-              </a:rPr>
-              <a:t>Future Goals</a:t>
-            </a:r>
-          </a:p>
-        </p:txBody>
-      </p:sp>
+            <a:endParaRPr lang="en-US" dirty="0">
+              <a:latin typeface="Segoe UI Light" panose="020B0502040204020203" pitchFamily="34" charset="0"/>
+              <a:cs typeface="Segoe UI Light" panose="020B0502040204020203" pitchFamily="34" charset="0"/>
+            </a:endParaRPr>
+          </a:p>
+        </p:txBody>
+      </p:sp>
+      <p:pic>
+        <p:nvPicPr>
+          <p:cNvPr id="5" name="Picture 4" descr="S71129-232241.jpg"/>
+          <p:cNvPicPr>
+            <a:picLocks noChangeAspect="1"/>
+          </p:cNvPicPr>
+          <p:nvPr/>
+        </p:nvPicPr>
+        <p:blipFill>
+          <a:blip r:embed="rId3" cstate="print"/>
+          <a:srcRect l="25787" t="27096" r="25659" b="41291"/>
+          <a:stretch>
+            <a:fillRect/>
+          </a:stretch>
+        </p:blipFill>
+        <p:spPr>
+          <a:xfrm>
+            <a:off x="9276735" y="501445"/>
+            <a:ext cx="1873046" cy="2168013"/>
+          </a:xfrm>
+          <a:prstGeom prst="rect">
+            <a:avLst/>
+          </a:prstGeom>
+        </p:spPr>
+      </p:pic>
     </p:spTree>
     <p:extLst>
       <p:ext uri="{BB962C8B-B14F-4D97-AF65-F5344CB8AC3E}">
-        <p14:creationId xmlns:p14="http://schemas.microsoft.com/office/powerpoint/2010/main" xmlns="" val="1386450005"/>
+        <p14:creationId xmlns="" xmlns:p14="http://schemas.microsoft.com/office/powerpoint/2010/main" val="1386450005"/>
       </p:ext>
     </p:extLst>
   </p:cSld>
@@ -3653,52 +3880,24 @@
           <a:lstStyle/>
           <a:p>
             <a:r>
-              <a:rPr lang="en-US" dirty="0">
-                <a:latin typeface="Segoe UI Light" panose="020B0502040204020203" pitchFamily="34" charset="0"/>
-                <a:cs typeface="Segoe UI Light" panose="020B0502040204020203" pitchFamily="34" charset="0"/>
-              </a:rPr>
-              <a:t>User Experience</a:t>
-            </a:r>
-          </a:p>
-        </p:txBody>
-      </p:sp>
-      <p:sp>
-        <p:nvSpPr>
-          <p:cNvPr id="3" name="Subtitle 2"/>
-          <p:cNvSpPr>
-            <a:spLocks noGrp="1"/>
-          </p:cNvSpPr>
-          <p:nvPr>
-            <p:ph idx="1"/>
-          </p:nvPr>
-        </p:nvSpPr>
-        <p:spPr/>
-        <p:txBody>
-          <a:bodyPr/>
-          <a:lstStyle/>
-          <a:p>
-            <a:r>
-              <a:rPr lang="en-US" dirty="0">
-                <a:latin typeface="Segoe UI Light" panose="020B0502040204020203" pitchFamily="34" charset="0"/>
-                <a:cs typeface="Segoe UI Light" panose="020B0502040204020203" pitchFamily="34" charset="0"/>
-              </a:rPr>
-              <a:t>What you did and why you did it</a:t>
-            </a:r>
-          </a:p>
-          <a:p>
-            <a:r>
-              <a:rPr lang="en-US" dirty="0">
-                <a:latin typeface="Segoe UI Light" panose="020B0502040204020203" pitchFamily="34" charset="0"/>
-                <a:cs typeface="Segoe UI Light" panose="020B0502040204020203" pitchFamily="34" charset="0"/>
-              </a:rPr>
-              <a:t>Branding, </a:t>
-            </a:r>
-            <a:r>
-              <a:rPr lang="en-US" dirty="0" err="1">
-                <a:latin typeface="Segoe UI Light" panose="020B0502040204020203" pitchFamily="34" charset="0"/>
-                <a:cs typeface="Segoe UI Light" panose="020B0502040204020203" pitchFamily="34" charset="0"/>
-              </a:rPr>
-              <a:t>etc</a:t>
+              <a:rPr lang="en-US" dirty="0" smtClean="0"/>
+              <a:t>The </a:t>
+            </a:r>
+            <a:r>
+              <a:rPr lang="en-US" dirty="0" err="1" smtClean="0"/>
+              <a:t>Contoso</a:t>
+            </a:r>
+            <a:r>
+              <a:rPr lang="en-US" dirty="0" smtClean="0"/>
+              <a:t> banking </a:t>
+            </a:r>
+            <a:r>
+              <a:rPr lang="en-US" dirty="0" err="1" smtClean="0"/>
+              <a:t>Chatbot</a:t>
+            </a:r>
+            <a:r>
+              <a:rPr lang="en-US" dirty="0" smtClean="0"/>
+              <a:t> : UX</a:t>
             </a:r>
             <a:endParaRPr lang="en-US" dirty="0">
               <a:latin typeface="Segoe UI Light" panose="020B0502040204020203" pitchFamily="34" charset="0"/>
@@ -3707,10 +3906,86 @@
           </a:p>
         </p:txBody>
       </p:sp>
+      <p:sp>
+        <p:nvSpPr>
+          <p:cNvPr id="3" name="Subtitle 2"/>
+          <p:cNvSpPr>
+            <a:spLocks noGrp="1"/>
+          </p:cNvSpPr>
+          <p:nvPr>
+            <p:ph idx="1"/>
+          </p:nvPr>
+        </p:nvSpPr>
+        <p:spPr>
+          <a:xfrm>
+            <a:off x="838200" y="1578077"/>
+            <a:ext cx="10515600" cy="4598886"/>
+          </a:xfrm>
+        </p:spPr>
+        <p:txBody>
+          <a:bodyPr/>
+          <a:lstStyle/>
+          <a:p>
+            <a:endParaRPr lang="en-US" dirty="0" smtClean="0"/>
+          </a:p>
+          <a:p>
+            <a:r>
+              <a:rPr lang="en-US" dirty="0" smtClean="0">
+                <a:latin typeface="Segoe UI Light" panose="020B0502040204020203" pitchFamily="34" charset="0"/>
+                <a:cs typeface="Segoe UI Light" panose="020B0502040204020203" pitchFamily="34" charset="0"/>
+              </a:rPr>
+              <a:t>Brainstorm</a:t>
+            </a:r>
+          </a:p>
+          <a:p>
+            <a:r>
+              <a:rPr lang="en-US" dirty="0" smtClean="0"/>
+              <a:t>Information that is hard to find on site (what exactly you should do when you lose your credit card)</a:t>
+            </a:r>
+          </a:p>
+          <a:p>
+            <a:r>
+              <a:rPr lang="en-US" dirty="0" smtClean="0"/>
+              <a:t>Updating personal info ( change of phone no, address, etc)</a:t>
+            </a:r>
+          </a:p>
+          <a:p>
+            <a:r>
+              <a:rPr lang="en-US" dirty="0" smtClean="0"/>
+              <a:t>Where are the ATMs?</a:t>
+            </a:r>
+          </a:p>
+          <a:p>
+            <a:r>
+              <a:rPr lang="en-US" dirty="0" smtClean="0"/>
+              <a:t>Easy to use</a:t>
+            </a:r>
+          </a:p>
+          <a:p>
+            <a:endParaRPr lang="en-US" dirty="0" smtClean="0">
+              <a:latin typeface="Segoe UI Light" panose="020B0502040204020203" pitchFamily="34" charset="0"/>
+              <a:cs typeface="Segoe UI Light" panose="020B0502040204020203" pitchFamily="34" charset="0"/>
+            </a:endParaRPr>
+          </a:p>
+          <a:p>
+            <a:endParaRPr lang="en-US" dirty="0">
+              <a:latin typeface="Segoe UI Light" panose="020B0502040204020203" pitchFamily="34" charset="0"/>
+              <a:cs typeface="Segoe UI Light" panose="020B0502040204020203" pitchFamily="34" charset="0"/>
+            </a:endParaRPr>
+          </a:p>
+          <a:p>
+            <a:pPr algn="l"/>
+            <a:endParaRPr lang="en-US" dirty="0">
+              <a:latin typeface="Segoe UI Light" panose="020B0502040204020203" pitchFamily="34" charset="0"/>
+              <a:cs typeface="Segoe UI Light" panose="020B0502040204020203" pitchFamily="34" charset="0"/>
+            </a:endParaRPr>
+          </a:p>
+        </p:txBody>
+      </p:sp>
     </p:spTree>
     <p:extLst>
       <p:ext uri="{BB962C8B-B14F-4D97-AF65-F5344CB8AC3E}">
-        <p14:creationId xmlns:p14="http://schemas.microsoft.com/office/powerpoint/2010/main" xmlns="" val="3387875208"/>
+        <p14:creationId xmlns="" xmlns:p14="http://schemas.microsoft.com/office/powerpoint/2010/main" val="1386450005"/>
       </p:ext>
     </p:extLst>
   </p:cSld>
@@ -3747,14 +4022,66 @@
             <p:ph type="title"/>
           </p:nvPr>
         </p:nvSpPr>
-        <p:spPr/>
-        <p:txBody>
-          <a:bodyPr/>
-          <a:lstStyle/>
-          <a:p>
-            <a:r>
-              <a:rPr lang="en-US" dirty="0"/>
-              <a:t>Databases</a:t>
+        <p:spPr>
+          <a:xfrm>
+            <a:off x="852949" y="0"/>
+            <a:ext cx="10515600" cy="1325563"/>
+          </a:xfrm>
+        </p:spPr>
+        <p:txBody>
+          <a:bodyPr/>
+          <a:lstStyle/>
+          <a:p>
+            <a:r>
+              <a:rPr lang="en-US" dirty="0">
+                <a:latin typeface="Segoe UI Light" panose="020B0502040204020203" pitchFamily="34" charset="0"/>
+                <a:cs typeface="Segoe UI Light" panose="020B0502040204020203" pitchFamily="34" charset="0"/>
+              </a:rPr>
+              <a:t>User Experience</a:t>
+            </a:r>
+          </a:p>
+        </p:txBody>
+      </p:sp>
+      <p:sp>
+        <p:nvSpPr>
+          <p:cNvPr id="3" name="Subtitle 2"/>
+          <p:cNvSpPr>
+            <a:spLocks noGrp="1"/>
+          </p:cNvSpPr>
+          <p:nvPr>
+            <p:ph idx="1"/>
+          </p:nvPr>
+        </p:nvSpPr>
+        <p:spPr>
+          <a:xfrm>
+            <a:off x="838200" y="1091381"/>
+            <a:ext cx="10515600" cy="5085582"/>
+          </a:xfrm>
+        </p:spPr>
+        <p:txBody>
+          <a:bodyPr/>
+          <a:lstStyle/>
+          <a:p>
+            <a:r>
+              <a:rPr lang="en-US" dirty="0" smtClean="0"/>
+              <a:t>Create a </a:t>
+            </a:r>
+            <a:r>
+              <a:rPr lang="en-US" dirty="0" err="1" smtClean="0"/>
+              <a:t>bot</a:t>
+            </a:r>
+            <a:r>
+              <a:rPr lang="en-US" dirty="0" smtClean="0"/>
+              <a:t> that helps customers with their inquiries</a:t>
+            </a:r>
+          </a:p>
+          <a:p>
+            <a:r>
+              <a:rPr lang="en-US" dirty="0" smtClean="0">
+                <a:latin typeface="Segoe UI Light" panose="020B0502040204020203" pitchFamily="34" charset="0"/>
+                <a:cs typeface="Segoe UI Light" panose="020B0502040204020203" pitchFamily="34" charset="0"/>
+              </a:rPr>
+              <a:t>A new alternative for people who prefers not to call.</a:t>
             </a:r>
             <a:endParaRPr lang="en-US" dirty="0">
               <a:latin typeface="Segoe UI Light" panose="020B0502040204020203" pitchFamily="34" charset="0"/>
@@ -3763,63 +4090,122 @@
           </a:p>
         </p:txBody>
       </p:sp>
-      <p:sp>
-        <p:nvSpPr>
-          <p:cNvPr id="3" name="Subtitle 2"/>
-          <p:cNvSpPr>
-            <a:spLocks noGrp="1"/>
-          </p:cNvSpPr>
-          <p:nvPr>
-            <p:ph idx="1"/>
-          </p:nvPr>
-        </p:nvSpPr>
-        <p:spPr/>
-        <p:txBody>
-          <a:bodyPr/>
-          <a:lstStyle/>
-          <a:p>
-            <a:pPr marL="0" indent="0">
-              <a:buNone/>
-            </a:pPr>
-            <a:r>
-              <a:rPr lang="en-US" dirty="0">
-                <a:latin typeface="Segoe UI Light" panose="020B0502040204020203" pitchFamily="34" charset="0"/>
-                <a:cs typeface="Segoe UI Light" panose="020B0502040204020203" pitchFamily="34" charset="0"/>
-              </a:rPr>
-              <a:t>- Your Schema, </a:t>
-            </a:r>
-            <a:r>
-              <a:rPr lang="en-US" dirty="0" err="1">
-                <a:latin typeface="Segoe UI Light" panose="020B0502040204020203" pitchFamily="34" charset="0"/>
-                <a:cs typeface="Segoe UI Light" panose="020B0502040204020203" pitchFamily="34" charset="0"/>
-              </a:rPr>
-              <a:t>EasyTables</a:t>
-            </a:r>
-            <a:r>
-              <a:rPr lang="en-US" dirty="0">
-                <a:latin typeface="Segoe UI Light" panose="020B0502040204020203" pitchFamily="34" charset="0"/>
-                <a:cs typeface="Segoe UI Light" panose="020B0502040204020203" pitchFamily="34" charset="0"/>
-              </a:rPr>
-              <a:t>, </a:t>
-            </a:r>
-            <a:r>
-              <a:rPr lang="en-US" dirty="0" err="1">
-                <a:latin typeface="Segoe UI Light" panose="020B0502040204020203" pitchFamily="34" charset="0"/>
-                <a:cs typeface="Segoe UI Light" panose="020B0502040204020203" pitchFamily="34" charset="0"/>
-              </a:rPr>
-              <a:t>etc</a:t>
-            </a:r>
-            <a:endParaRPr lang="en-US" dirty="0">
-              <a:latin typeface="Segoe UI Light" panose="020B0502040204020203" pitchFamily="34" charset="0"/>
-              <a:cs typeface="Segoe UI Light" panose="020B0502040204020203" pitchFamily="34" charset="0"/>
-            </a:endParaRPr>
-          </a:p>
-        </p:txBody>
-      </p:sp>
+      <p:pic>
+        <p:nvPicPr>
+          <p:cNvPr id="6" name="Picture 5" descr="ChatLogo2.png"/>
+          <p:cNvPicPr>
+            <a:picLocks noChangeAspect="1"/>
+          </p:cNvPicPr>
+          <p:nvPr/>
+        </p:nvPicPr>
+        <p:blipFill>
+          <a:blip r:embed="rId3" cstate="print"/>
+          <a:stretch>
+            <a:fillRect/>
+          </a:stretch>
+        </p:blipFill>
+        <p:spPr>
+          <a:xfrm>
+            <a:off x="9601200" y="444909"/>
+            <a:ext cx="1564201" cy="1564201"/>
+          </a:xfrm>
+          <a:prstGeom prst="rect">
+            <a:avLst/>
+          </a:prstGeom>
+        </p:spPr>
+      </p:pic>
+      <p:pic>
+        <p:nvPicPr>
+          <p:cNvPr id="7" name="Picture 3"/>
+          <p:cNvPicPr>
+            <a:picLocks noChangeAspect="1" noChangeArrowheads="1"/>
+          </p:cNvPicPr>
+          <p:nvPr/>
+        </p:nvPicPr>
+        <p:blipFill>
+          <a:blip r:embed="rId4" cstate="print"/>
+          <a:srcRect/>
+          <a:stretch>
+            <a:fillRect/>
+          </a:stretch>
+        </p:blipFill>
+        <p:spPr bwMode="auto">
+          <a:xfrm>
+            <a:off x="9432367" y="2477728"/>
+            <a:ext cx="2496925" cy="3356793"/>
+          </a:xfrm>
+          <a:prstGeom prst="rect">
+            <a:avLst/>
+          </a:prstGeom>
+          <a:noFill/>
+          <a:ln w="9525">
+            <a:noFill/>
+            <a:miter lim="800000"/>
+            <a:headEnd/>
+            <a:tailEnd/>
+          </a:ln>
+        </p:spPr>
+      </p:pic>
+      <p:pic>
+        <p:nvPicPr>
+          <p:cNvPr id="8" name="Picture 7" descr="N2oJuJX.png"/>
+          <p:cNvPicPr>
+            <a:picLocks noChangeAspect="1"/>
+          </p:cNvPicPr>
+          <p:nvPr/>
+        </p:nvPicPr>
+        <p:blipFill>
+          <a:blip r:embed="rId5" cstate="print"/>
+          <a:stretch>
+            <a:fillRect/>
+          </a:stretch>
+        </p:blipFill>
+        <p:spPr>
+          <a:xfrm>
+            <a:off x="4616245" y="2211840"/>
+            <a:ext cx="4399935" cy="4407574"/>
+          </a:xfrm>
+          <a:prstGeom prst="rect">
+            <a:avLst/>
+          </a:prstGeom>
+        </p:spPr>
+      </p:pic>
+      <p:pic>
+        <p:nvPicPr>
+          <p:cNvPr id="2050" name="Picture 2"/>
+          <p:cNvPicPr>
+            <a:picLocks noChangeAspect="1" noChangeArrowheads="1"/>
+          </p:cNvPicPr>
+          <p:nvPr/>
+        </p:nvPicPr>
+        <p:blipFill>
+          <a:blip r:embed="rId6" cstate="print"/>
+          <a:srcRect/>
+          <a:stretch>
+            <a:fillRect/>
+          </a:stretch>
+        </p:blipFill>
+        <p:spPr bwMode="auto">
+          <a:xfrm>
+            <a:off x="413416" y="2503231"/>
+            <a:ext cx="3990975" cy="3562350"/>
+          </a:xfrm>
+          <a:prstGeom prst="rect">
+            <a:avLst/>
+          </a:prstGeom>
+          <a:noFill/>
+          <a:ln w="9525">
+            <a:noFill/>
+            <a:miter lim="800000"/>
+            <a:headEnd/>
+            <a:tailEnd/>
+          </a:ln>
+        </p:spPr>
+      </p:pic>
     </p:spTree>
     <p:extLst>
       <p:ext uri="{BB962C8B-B14F-4D97-AF65-F5344CB8AC3E}">
-        <p14:creationId xmlns:p14="http://schemas.microsoft.com/office/powerpoint/2010/main" xmlns="" val="2098138885"/>
+        <p14:creationId xmlns="" xmlns:p14="http://schemas.microsoft.com/office/powerpoint/2010/main" val="3387875208"/>
       </p:ext>
     </p:extLst>
   </p:cSld>
@@ -3863,7 +4249,7 @@
           <a:p>
             <a:r>
               <a:rPr lang="en-US" dirty="0"/>
-              <a:t>API</a:t>
+              <a:t>Databases</a:t>
             </a:r>
             <a:endParaRPr lang="en-US" dirty="0">
               <a:latin typeface="Segoe UI Light" panose="020B0502040204020203" pitchFamily="34" charset="0"/>
@@ -3882,76 +4268,81 @@
             <p:ph idx="1"/>
           </p:nvPr>
         </p:nvSpPr>
-        <p:spPr>
-          <a:xfrm>
-            <a:off x="852949" y="1412671"/>
-            <a:ext cx="10515600" cy="4351338"/>
-          </a:xfrm>
-        </p:spPr>
-        <p:txBody>
-          <a:bodyPr/>
-          <a:lstStyle/>
-          <a:p>
-            <a:pPr marL="0" indent="0">
-              <a:buNone/>
-            </a:pPr>
+        <p:spPr/>
+        <p:txBody>
+          <a:bodyPr/>
+          <a:lstStyle/>
+          <a:p>
+            <a:pPr marL="0" indent="0"/>
+            <a:r>
+              <a:rPr lang="en-US" dirty="0" smtClean="0"/>
+              <a:t> </a:t>
+            </a:r>
+            <a:r>
+              <a:rPr lang="en-US" dirty="0" smtClean="0"/>
+              <a:t>used Azure’s Easy tables</a:t>
+            </a:r>
+          </a:p>
+          <a:p>
+            <a:pPr marL="0" indent="0"/>
+            <a:r>
+              <a:rPr lang="en-US" dirty="0" smtClean="0"/>
+              <a:t> </a:t>
+            </a:r>
+            <a:r>
+              <a:rPr lang="en-US" dirty="0" smtClean="0"/>
+              <a:t>C</a:t>
+            </a:r>
+            <a:r>
+              <a:rPr lang="en-US" dirty="0" smtClean="0"/>
+              <a:t>ontains customer’s basic information so we can identify them, and help them better</a:t>
+            </a:r>
+          </a:p>
+          <a:p>
+            <a:pPr marL="0" indent="0"/>
+            <a:r>
+              <a:rPr lang="en-US" dirty="0" smtClean="0"/>
+              <a:t>Username, name, mobile, email, client number</a:t>
+            </a:r>
+            <a:endParaRPr lang="en-US" dirty="0" smtClean="0"/>
+          </a:p>
+          <a:p>
+            <a:pPr marL="0" indent="0"/>
+            <a:r>
+              <a:rPr lang="en-US" dirty="0" smtClean="0">
+                <a:latin typeface="Segoe UI Light" panose="020B0502040204020203" pitchFamily="34" charset="0"/>
+                <a:cs typeface="Segoe UI Light" panose="020B0502040204020203" pitchFamily="34" charset="0"/>
+              </a:rPr>
+              <a:t>Address them by their name, so the </a:t>
+            </a:r>
+            <a:r>
+              <a:rPr lang="en-US" dirty="0" err="1" smtClean="0">
+                <a:latin typeface="Segoe UI Light" panose="020B0502040204020203" pitchFamily="34" charset="0"/>
+                <a:cs typeface="Segoe UI Light" panose="020B0502040204020203" pitchFamily="34" charset="0"/>
+              </a:rPr>
+              <a:t>bot</a:t>
+            </a:r>
+            <a:r>
+              <a:rPr lang="en-US" dirty="0" smtClean="0">
+                <a:latin typeface="Segoe UI Light" panose="020B0502040204020203" pitchFamily="34" charset="0"/>
+                <a:cs typeface="Segoe UI Light" panose="020B0502040204020203" pitchFamily="34" charset="0"/>
+              </a:rPr>
+              <a:t> is less robot like</a:t>
+            </a:r>
+          </a:p>
+          <a:p>
+            <a:pPr marL="0" indent="0"/>
             <a:endParaRPr lang="en-US" dirty="0" smtClean="0">
               <a:latin typeface="Segoe UI Light" panose="020B0502040204020203" pitchFamily="34" charset="0"/>
               <a:cs typeface="Segoe UI Light" panose="020B0502040204020203" pitchFamily="34" charset="0"/>
             </a:endParaRPr>
           </a:p>
-          <a:p>
-            <a:pPr marL="0" indent="0"/>
-            <a:r>
-              <a:rPr lang="en-US" dirty="0" smtClean="0"/>
-              <a:t>LUIS – help understand what the user </a:t>
-            </a:r>
-            <a:r>
-              <a:rPr lang="en-US" dirty="0" err="1" smtClean="0"/>
-              <a:t>wantsYelp</a:t>
-            </a:r>
-            <a:endParaRPr lang="en-US" dirty="0" smtClean="0"/>
-          </a:p>
-          <a:p>
-            <a:pPr marL="0" indent="0"/>
-            <a:r>
-              <a:rPr lang="en-US" dirty="0" smtClean="0"/>
-              <a:t> </a:t>
-            </a:r>
-            <a:r>
-              <a:rPr lang="en-US" dirty="0" smtClean="0"/>
-              <a:t>API – To look for banks in their desired </a:t>
-            </a:r>
-            <a:r>
-              <a:rPr lang="en-US" dirty="0" smtClean="0"/>
-              <a:t>location</a:t>
-            </a:r>
-          </a:p>
-          <a:p>
-            <a:pPr marL="0" indent="0"/>
-            <a:r>
-              <a:rPr lang="en-US" dirty="0" err="1" smtClean="0"/>
-              <a:t>QnA</a:t>
-            </a:r>
-            <a:r>
-              <a:rPr lang="en-US" dirty="0" smtClean="0"/>
-              <a:t> – to answer their questions about the bank.</a:t>
-            </a:r>
-            <a:endParaRPr lang="en-US" dirty="0" smtClean="0"/>
-          </a:p>
-          <a:p>
-            <a:pPr marL="0" indent="0"/>
-            <a:endParaRPr lang="en-US" dirty="0">
-              <a:latin typeface="Segoe UI Light" panose="020B0502040204020203" pitchFamily="34" charset="0"/>
-              <a:cs typeface="Segoe UI Light" panose="020B0502040204020203" pitchFamily="34" charset="0"/>
-            </a:endParaRPr>
-          </a:p>
         </p:txBody>
       </p:sp>
     </p:spTree>
     <p:extLst>
       <p:ext uri="{BB962C8B-B14F-4D97-AF65-F5344CB8AC3E}">
-        <p14:creationId xmlns:p14="http://schemas.microsoft.com/office/powerpoint/2010/main" xmlns="" val="276898515"/>
+        <p14:creationId xmlns="" xmlns:p14="http://schemas.microsoft.com/office/powerpoint/2010/main" val="2098138885"/>
       </p:ext>
     </p:extLst>
   </p:cSld>
@@ -3994,33 +4385,9 @@
           <a:lstStyle/>
           <a:p>
             <a:r>
-              <a:rPr lang="en-US" dirty="0">
-                <a:latin typeface="Segoe UI Light" panose="020B0502040204020203" pitchFamily="34" charset="0"/>
-                <a:cs typeface="Segoe UI Light" panose="020B0502040204020203" pitchFamily="34" charset="0"/>
-              </a:rPr>
-              <a:t>Azure Setup</a:t>
-            </a:r>
-          </a:p>
-        </p:txBody>
-      </p:sp>
-      <p:sp>
-        <p:nvSpPr>
-          <p:cNvPr id="3" name="Subtitle 2"/>
-          <p:cNvSpPr>
-            <a:spLocks noGrp="1"/>
-          </p:cNvSpPr>
-          <p:nvPr>
-            <p:ph idx="1"/>
-          </p:nvPr>
-        </p:nvSpPr>
-        <p:spPr/>
-        <p:txBody>
-          <a:bodyPr/>
-          <a:lstStyle/>
-          <a:p>
-            <a:pPr marL="0" indent="0">
-              <a:buNone/>
-            </a:pPr>
+              <a:rPr lang="en-US" dirty="0"/>
+              <a:t>API</a:t>
+            </a:r>
             <a:endParaRPr lang="en-US" dirty="0">
               <a:latin typeface="Segoe UI Light" panose="020B0502040204020203" pitchFamily="34" charset="0"/>
               <a:cs typeface="Segoe UI Light" panose="020B0502040204020203" pitchFamily="34" charset="0"/>
@@ -4028,10 +4395,77 @@
           </a:p>
         </p:txBody>
       </p:sp>
+      <p:sp>
+        <p:nvSpPr>
+          <p:cNvPr id="3" name="Subtitle 2"/>
+          <p:cNvSpPr>
+            <a:spLocks noGrp="1"/>
+          </p:cNvSpPr>
+          <p:nvPr>
+            <p:ph idx="1"/>
+          </p:nvPr>
+        </p:nvSpPr>
+        <p:spPr>
+          <a:xfrm>
+            <a:off x="852949" y="1412671"/>
+            <a:ext cx="10515600" cy="4351338"/>
+          </a:xfrm>
+        </p:spPr>
+        <p:txBody>
+          <a:bodyPr/>
+          <a:lstStyle/>
+          <a:p>
+            <a:pPr marL="0" indent="0">
+              <a:buNone/>
+            </a:pPr>
+            <a:endParaRPr lang="en-US" dirty="0" smtClean="0">
+              <a:latin typeface="Segoe UI Light" panose="020B0502040204020203" pitchFamily="34" charset="0"/>
+              <a:cs typeface="Segoe UI Light" panose="020B0502040204020203" pitchFamily="34" charset="0"/>
+            </a:endParaRPr>
+          </a:p>
+          <a:p>
+            <a:pPr marL="0" indent="0"/>
+            <a:r>
+              <a:rPr lang="en-US" dirty="0" smtClean="0"/>
+              <a:t>LUIS – help understand what the user </a:t>
+            </a:r>
+            <a:r>
+              <a:rPr lang="en-US" dirty="0" smtClean="0"/>
+              <a:t>wants</a:t>
+            </a:r>
+            <a:endParaRPr lang="en-US" dirty="0" smtClean="0"/>
+          </a:p>
+          <a:p>
+            <a:pPr marL="0" indent="0"/>
+            <a:r>
+              <a:rPr lang="en-US" dirty="0" smtClean="0"/>
+              <a:t> API – To look for banks in their desired location</a:t>
+            </a:r>
+          </a:p>
+          <a:p>
+            <a:pPr marL="0" indent="0"/>
+            <a:r>
+              <a:rPr lang="en-US" dirty="0" err="1" smtClean="0"/>
+              <a:t>QnA</a:t>
+            </a:r>
+            <a:r>
+              <a:rPr lang="en-US" dirty="0" smtClean="0"/>
+              <a:t> – to answer their questions about the bank.</a:t>
+            </a:r>
+          </a:p>
+          <a:p>
+            <a:pPr marL="0" indent="0"/>
+            <a:endParaRPr lang="en-US" dirty="0">
+              <a:latin typeface="Segoe UI Light" panose="020B0502040204020203" pitchFamily="34" charset="0"/>
+              <a:cs typeface="Segoe UI Light" panose="020B0502040204020203" pitchFamily="34" charset="0"/>
+            </a:endParaRPr>
+          </a:p>
+        </p:txBody>
+      </p:sp>
     </p:spTree>
     <p:extLst>
       <p:ext uri="{BB962C8B-B14F-4D97-AF65-F5344CB8AC3E}">
-        <p14:creationId xmlns:p14="http://schemas.microsoft.com/office/powerpoint/2010/main" xmlns="" val="735530574"/>
+        <p14:creationId xmlns="" xmlns:p14="http://schemas.microsoft.com/office/powerpoint/2010/main" val="276898515"/>
       </p:ext>
     </p:extLst>
   </p:cSld>
@@ -4078,14 +4512,14 @@
                 <a:latin typeface="Segoe UI Light" panose="020B0502040204020203" pitchFamily="34" charset="0"/>
                 <a:cs typeface="Segoe UI Light" panose="020B0502040204020203" pitchFamily="34" charset="0"/>
               </a:rPr>
-              <a:t>Advanced Features</a:t>
-            </a:r>
-          </a:p>
-        </p:txBody>
-      </p:sp>
-      <p:sp>
-        <p:nvSpPr>
-          <p:cNvPr id="3" name="Subtitle 2"/>
+              <a:t>Azure Setup</a:t>
+            </a:r>
+          </a:p>
+        </p:txBody>
+      </p:sp>
+      <p:sp>
+        <p:nvSpPr>
+          <p:cNvPr id="5" name="Content Placeholder 4"/>
           <p:cNvSpPr>
             <a:spLocks noGrp="1"/>
           </p:cNvSpPr>
@@ -4098,26 +4532,62 @@
           <a:bodyPr/>
           <a:lstStyle/>
           <a:p>
-            <a:pPr marL="0" indent="0">
-              <a:buNone/>
-            </a:pPr>
-            <a:endParaRPr lang="en-US" dirty="0">
-              <a:latin typeface="Segoe UI Light" panose="020B0502040204020203" pitchFamily="34" charset="0"/>
-              <a:cs typeface="Segoe UI Light" panose="020B0502040204020203" pitchFamily="34" charset="0"/>
-            </a:endParaRPr>
+            <a:r>
+              <a:rPr lang="en-NZ" dirty="0" smtClean="0"/>
+              <a:t>Easy tables</a:t>
+            </a:r>
+          </a:p>
+          <a:p>
+            <a:r>
+              <a:rPr lang="en-NZ" dirty="0" smtClean="0"/>
+              <a:t>Web App </a:t>
+            </a:r>
+            <a:r>
+              <a:rPr lang="en-NZ" dirty="0" smtClean="0">
+                <a:hlinkClick r:id="rId3"/>
+              </a:rPr>
+              <a:t>http://websitecontosobank1220.azurewebsites.net</a:t>
+            </a:r>
+            <a:r>
+              <a:rPr lang="en-NZ" dirty="0" smtClean="0">
+                <a:hlinkClick r:id="rId3"/>
+              </a:rPr>
+              <a:t>/</a:t>
+            </a:r>
+            <a:endParaRPr lang="en-NZ" dirty="0" smtClean="0"/>
+          </a:p>
+          <a:p>
+            <a:r>
+              <a:rPr lang="en-NZ" dirty="0" err="1" smtClean="0"/>
+              <a:t>Bot</a:t>
+            </a:r>
+            <a:r>
+              <a:rPr lang="en-NZ" dirty="0" smtClean="0"/>
+              <a:t> framework</a:t>
+            </a:r>
+          </a:p>
+          <a:p>
+            <a:endParaRPr lang="en-NZ" dirty="0"/>
           </a:p>
         </p:txBody>
       </p:sp>
     </p:spTree>
     <p:extLst>
       <p:ext uri="{BB962C8B-B14F-4D97-AF65-F5344CB8AC3E}">
-        <p14:creationId xmlns:p14="http://schemas.microsoft.com/office/powerpoint/2010/main" xmlns="" val="572045017"/>
+        <p14:creationId xmlns="" xmlns:p14="http://schemas.microsoft.com/office/powerpoint/2010/main" val="735530574"/>
       </p:ext>
     </p:extLst>
   </p:cSld>
   <p:clrMapOvr>
     <a:masterClrMapping/>
   </p:clrMapOvr>
+  <p:timing>
+    <p:tnLst>
+      <p:par>
+        <p:cTn id="1" dur="indefinite" restart="never" nodeType="tmRoot"/>
+      </p:par>
+    </p:tnLst>
+  </p:timing>
 </p:sld>
 </file>
 
@@ -4148,7 +4618,12 @@
             <p:ph type="title"/>
           </p:nvPr>
         </p:nvSpPr>
-        <p:spPr/>
+        <p:spPr>
+          <a:xfrm>
+            <a:off x="852948" y="0"/>
+            <a:ext cx="10515600" cy="1325563"/>
+          </a:xfrm>
+        </p:spPr>
         <p:txBody>
           <a:bodyPr/>
           <a:lstStyle/>
@@ -4158,7 +4633,7 @@
                 <a:latin typeface="Segoe UI Light" panose="020B0502040204020203" pitchFamily="34" charset="0"/>
                 <a:cs typeface="Segoe UI Light" panose="020B0502040204020203" pitchFamily="34" charset="0"/>
               </a:rPr>
-              <a:t>Advanced Considerations</a:t>
+              <a:t>Advanced Features</a:t>
             </a:r>
           </a:p>
         </p:txBody>
@@ -4173,14 +4648,61 @@
             <p:ph idx="1"/>
           </p:nvPr>
         </p:nvSpPr>
-        <p:spPr/>
-        <p:txBody>
-          <a:bodyPr/>
-          <a:lstStyle/>
-          <a:p>
-            <a:pPr marL="0" indent="0">
-              <a:buNone/>
-            </a:pPr>
+        <p:spPr>
+          <a:xfrm>
+            <a:off x="838200" y="1014463"/>
+            <a:ext cx="10515600" cy="5047123"/>
+          </a:xfrm>
+        </p:spPr>
+        <p:txBody>
+          <a:bodyPr/>
+          <a:lstStyle/>
+          <a:p>
+            <a:pPr marL="0" indent="0"/>
+            <a:r>
+              <a:rPr lang="en-US" dirty="0" smtClean="0"/>
+              <a:t>Distinguishable logo</a:t>
+            </a:r>
+          </a:p>
+          <a:p>
+            <a:pPr marL="0" indent="0"/>
+            <a:endParaRPr lang="en-US" dirty="0" smtClean="0">
+              <a:latin typeface="Segoe UI Light" panose="020B0502040204020203" pitchFamily="34" charset="0"/>
+              <a:cs typeface="Segoe UI Light" panose="020B0502040204020203" pitchFamily="34" charset="0"/>
+            </a:endParaRPr>
+          </a:p>
+          <a:p>
+            <a:pPr marL="0" indent="0"/>
+            <a:endParaRPr lang="en-US" dirty="0" smtClean="0"/>
+          </a:p>
+          <a:p>
+            <a:pPr marL="0" indent="0"/>
+            <a:endParaRPr lang="en-US" dirty="0" smtClean="0">
+              <a:latin typeface="Segoe UI Light" panose="020B0502040204020203" pitchFamily="34" charset="0"/>
+              <a:cs typeface="Segoe UI Light" panose="020B0502040204020203" pitchFamily="34" charset="0"/>
+            </a:endParaRPr>
+          </a:p>
+          <a:p>
+            <a:pPr marL="0" indent="0"/>
+            <a:r>
+              <a:rPr lang="en-US" dirty="0" smtClean="0"/>
+              <a:t>Tested to give room for input errors</a:t>
+            </a:r>
+            <a:endParaRPr lang="en-US" dirty="0" smtClean="0"/>
+          </a:p>
+          <a:p>
+            <a:pPr marL="0" indent="0"/>
+            <a:endParaRPr lang="en-US" dirty="0" smtClean="0">
+              <a:latin typeface="Segoe UI Light" panose="020B0502040204020203" pitchFamily="34" charset="0"/>
+              <a:cs typeface="Segoe UI Light" panose="020B0502040204020203" pitchFamily="34" charset="0"/>
+            </a:endParaRPr>
+          </a:p>
+          <a:p>
+            <a:pPr marL="0" indent="0"/>
+            <a:r>
+              <a:rPr lang="en-US" dirty="0" smtClean="0"/>
+              <a:t>Smaller screens? No problem!</a:t>
+            </a:r>
             <a:endParaRPr lang="en-US" dirty="0">
               <a:latin typeface="Segoe UI Light" panose="020B0502040204020203" pitchFamily="34" charset="0"/>
               <a:cs typeface="Segoe UI Light" panose="020B0502040204020203" pitchFamily="34" charset="0"/>
@@ -4188,16 +4710,167 @@
           </a:p>
         </p:txBody>
       </p:sp>
+      <p:pic>
+        <p:nvPicPr>
+          <p:cNvPr id="4" name="Picture 3" descr="ChatLogo2.png"/>
+          <p:cNvPicPr>
+            <a:picLocks noChangeAspect="1"/>
+          </p:cNvPicPr>
+          <p:nvPr/>
+        </p:nvPicPr>
+        <p:blipFill>
+          <a:blip r:embed="rId3" cstate="print"/>
+          <a:stretch>
+            <a:fillRect/>
+          </a:stretch>
+        </p:blipFill>
+        <p:spPr>
+          <a:xfrm>
+            <a:off x="1106133" y="1477297"/>
+            <a:ext cx="1339644" cy="1339644"/>
+          </a:xfrm>
+          <a:prstGeom prst="rect">
+            <a:avLst/>
+          </a:prstGeom>
+        </p:spPr>
+      </p:pic>
+      <p:pic>
+        <p:nvPicPr>
+          <p:cNvPr id="5" name="Picture 4" descr="BankLogo2.png"/>
+          <p:cNvPicPr>
+            <a:picLocks noChangeAspect="1"/>
+          </p:cNvPicPr>
+          <p:nvPr/>
+        </p:nvPicPr>
+        <p:blipFill>
+          <a:blip r:embed="rId4" cstate="print"/>
+          <a:stretch>
+            <a:fillRect/>
+          </a:stretch>
+        </p:blipFill>
+        <p:spPr>
+          <a:xfrm>
+            <a:off x="2964421" y="1492044"/>
+            <a:ext cx="1310150" cy="1310150"/>
+          </a:xfrm>
+          <a:prstGeom prst="rect">
+            <a:avLst/>
+          </a:prstGeom>
+        </p:spPr>
+      </p:pic>
+      <p:pic>
+        <p:nvPicPr>
+          <p:cNvPr id="1026" name="Picture 2"/>
+          <p:cNvPicPr>
+            <a:picLocks noChangeAspect="1" noChangeArrowheads="1"/>
+          </p:cNvPicPr>
+          <p:nvPr/>
+        </p:nvPicPr>
+        <p:blipFill>
+          <a:blip r:embed="rId5" cstate="print"/>
+          <a:srcRect/>
+          <a:stretch>
+            <a:fillRect/>
+          </a:stretch>
+        </p:blipFill>
+        <p:spPr bwMode="auto">
+          <a:xfrm>
+            <a:off x="6046838" y="462399"/>
+            <a:ext cx="5334000" cy="2496345"/>
+          </a:xfrm>
+          <a:prstGeom prst="rect">
+            <a:avLst/>
+          </a:prstGeom>
+          <a:noFill/>
+          <a:ln w="9525">
+            <a:noFill/>
+            <a:miter lim="800000"/>
+            <a:headEnd/>
+            <a:tailEnd/>
+          </a:ln>
+        </p:spPr>
+      </p:pic>
+      <p:pic>
+        <p:nvPicPr>
+          <p:cNvPr id="1027" name="Picture 3"/>
+          <p:cNvPicPr>
+            <a:picLocks noChangeAspect="1" noChangeArrowheads="1"/>
+          </p:cNvPicPr>
+          <p:nvPr/>
+        </p:nvPicPr>
+        <p:blipFill>
+          <a:blip r:embed="rId6" cstate="print"/>
+          <a:srcRect/>
+          <a:stretch>
+            <a:fillRect/>
+          </a:stretch>
+        </p:blipFill>
+        <p:spPr bwMode="auto">
+          <a:xfrm>
+            <a:off x="6032090" y="3581891"/>
+            <a:ext cx="2136363" cy="2872063"/>
+          </a:xfrm>
+          <a:prstGeom prst="rect">
+            <a:avLst/>
+          </a:prstGeom>
+          <a:noFill/>
+          <a:ln w="9525">
+            <a:noFill/>
+            <a:miter lim="800000"/>
+            <a:headEnd/>
+            <a:tailEnd/>
+          </a:ln>
+        </p:spPr>
+      </p:pic>
+      <p:pic>
+        <p:nvPicPr>
+          <p:cNvPr id="1029" name="Picture 5"/>
+          <p:cNvPicPr>
+            <a:picLocks noChangeAspect="1" noChangeArrowheads="1"/>
+          </p:cNvPicPr>
+          <p:nvPr/>
+        </p:nvPicPr>
+        <p:blipFill>
+          <a:blip r:embed="rId7" cstate="print"/>
+          <a:srcRect/>
+          <a:stretch>
+            <a:fillRect/>
+          </a:stretch>
+        </p:blipFill>
+        <p:spPr bwMode="auto">
+          <a:xfrm>
+            <a:off x="8442530" y="3247565"/>
+            <a:ext cx="3448050" cy="3076575"/>
+          </a:xfrm>
+          <a:prstGeom prst="rect">
+            <a:avLst/>
+          </a:prstGeom>
+          <a:noFill/>
+          <a:ln w="9525">
+            <a:noFill/>
+            <a:miter lim="800000"/>
+            <a:headEnd/>
+            <a:tailEnd/>
+          </a:ln>
+        </p:spPr>
+      </p:pic>
     </p:spTree>
     <p:extLst>
       <p:ext uri="{BB962C8B-B14F-4D97-AF65-F5344CB8AC3E}">
-        <p14:creationId xmlns:p14="http://schemas.microsoft.com/office/powerpoint/2010/main" xmlns="" val="2870665585"/>
+        <p14:creationId xmlns="" xmlns:p14="http://schemas.microsoft.com/office/powerpoint/2010/main" val="572045017"/>
       </p:ext>
     </p:extLst>
   </p:cSld>
   <p:clrMapOvr>
     <a:masterClrMapping/>
   </p:clrMapOvr>
+  <p:timing>
+    <p:tnLst>
+      <p:par>
+        <p:cTn id="1" dur="indefinite" restart="never" nodeType="tmRoot"/>
+      </p:par>
+    </p:tnLst>
+  </p:timing>
 </p:sld>
 </file>
 
@@ -4238,7 +4911,7 @@
                 <a:latin typeface="Segoe UI Light" panose="020B0502040204020203" pitchFamily="34" charset="0"/>
                 <a:cs typeface="Segoe UI Light" panose="020B0502040204020203" pitchFamily="34" charset="0"/>
               </a:rPr>
-              <a:t>Final Comments</a:t>
+              <a:t>Advanced Considerations</a:t>
             </a:r>
           </a:p>
         </p:txBody>
@@ -4258,9 +4931,48 @@
           <a:bodyPr/>
           <a:lstStyle/>
           <a:p>
-            <a:pPr marL="0" indent="0">
-              <a:buNone/>
-            </a:pPr>
+            <a:pPr marL="0" indent="0"/>
+            <a:r>
+              <a:rPr lang="en-US" dirty="0" smtClean="0">
+                <a:latin typeface="Segoe UI Light" panose="020B0502040204020203" pitchFamily="34" charset="0"/>
+                <a:cs typeface="Segoe UI Light" panose="020B0502040204020203" pitchFamily="34" charset="0"/>
+              </a:rPr>
+              <a:t> </a:t>
+            </a:r>
+            <a:r>
+              <a:rPr lang="en-US" dirty="0" err="1" smtClean="0">
+                <a:latin typeface="Segoe UI Light" panose="020B0502040204020203" pitchFamily="34" charset="0"/>
+                <a:cs typeface="Segoe UI Light" panose="020B0502040204020203" pitchFamily="34" charset="0"/>
+              </a:rPr>
+              <a:t>Colour</a:t>
+            </a:r>
+            <a:r>
+              <a:rPr lang="en-US" dirty="0" smtClean="0">
+                <a:latin typeface="Segoe UI Light" panose="020B0502040204020203" pitchFamily="34" charset="0"/>
+                <a:cs typeface="Segoe UI Light" panose="020B0502040204020203" pitchFamily="34" charset="0"/>
+              </a:rPr>
+              <a:t> scheme</a:t>
+            </a:r>
+          </a:p>
+          <a:p>
+            <a:pPr marL="0" indent="0"/>
+            <a:r>
+              <a:rPr lang="en-US" dirty="0" smtClean="0">
+                <a:latin typeface="Segoe UI Light" panose="020B0502040204020203" pitchFamily="34" charset="0"/>
+                <a:cs typeface="Segoe UI Light" panose="020B0502040204020203" pitchFamily="34" charset="0"/>
+              </a:rPr>
+              <a:t> Tested to give room for input errors</a:t>
+            </a:r>
+          </a:p>
+          <a:p>
+            <a:pPr marL="0" indent="0"/>
+            <a:endParaRPr lang="en-US" dirty="0" smtClean="0">
+              <a:latin typeface="Segoe UI Light" panose="020B0502040204020203" pitchFamily="34" charset="0"/>
+              <a:cs typeface="Segoe UI Light" panose="020B0502040204020203" pitchFamily="34" charset="0"/>
+            </a:endParaRPr>
+          </a:p>
+          <a:p>
+            <a:pPr marL="0" indent="0"/>
             <a:endParaRPr lang="en-US" dirty="0">
               <a:latin typeface="Segoe UI Light" panose="020B0502040204020203" pitchFamily="34" charset="0"/>
               <a:cs typeface="Segoe UI Light" panose="020B0502040204020203" pitchFamily="34" charset="0"/>
@@ -4271,13 +4983,20 @@
     </p:spTree>
     <p:extLst>
       <p:ext uri="{BB962C8B-B14F-4D97-AF65-F5344CB8AC3E}">
-        <p14:creationId xmlns:p14="http://schemas.microsoft.com/office/powerpoint/2010/main" xmlns="" val="1095715971"/>
+        <p14:creationId xmlns="" xmlns:p14="http://schemas.microsoft.com/office/powerpoint/2010/main" val="2870665585"/>
       </p:ext>
     </p:extLst>
   </p:cSld>
   <p:clrMapOvr>
     <a:masterClrMapping/>
   </p:clrMapOvr>
+  <p:timing>
+    <p:tnLst>
+      <p:par>
+        <p:cTn id="1" dur="indefinite" restart="never" nodeType="tmRoot"/>
+      </p:par>
+    </p:tnLst>
+  </p:timing>
 </p:sld>
 </file>
 
@@ -4570,7 +5289,7 @@
   <a:extraClrSchemeLst/>
   <a:extLst>
     <a:ext uri="{05A4C25C-085E-4340-85A3-A5531E510DB2}">
-      <thm15:themeFamily xmlns:thm15="http://schemas.microsoft.com/office/thememl/2012/main" xmlns="" name="Office Theme" id="{62F939B6-93AF-4DB8-9C6B-D6C7DFDC589F}" vid="{4A3C46E8-61CC-4603-A589-7422A47A8E4A}"/>
+      <thm15:themeFamily xmlns="" xmlns:thm15="http://schemas.microsoft.com/office/thememl/2012/main" name="Office Theme" id="{62F939B6-93AF-4DB8-9C6B-D6C7DFDC589F}" vid="{4A3C46E8-61CC-4603-A589-7422A47A8E4A}"/>
     </a:ext>
   </a:extLst>
 </a:theme>
@@ -4865,7 +5584,7 @@
   <a:extraClrSchemeLst/>
   <a:extLst>
     <a:ext uri="{05A4C25C-085E-4340-85A3-A5531E510DB2}">
-      <thm15:themeFamily xmlns:thm15="http://schemas.microsoft.com/office/thememl/2012/main" xmlns="" name="Office Theme" id="{62F939B6-93AF-4DB8-9C6B-D6C7DFDC589F}" vid="{4A3C46E8-61CC-4603-A589-7422A47A8E4A}"/>
+      <thm15:themeFamily xmlns="" xmlns:thm15="http://schemas.microsoft.com/office/thememl/2012/main" name="Office Theme" id="{62F939B6-93AF-4DB8-9C6B-D6C7DFDC589F}" vid="{4A3C46E8-61CC-4603-A589-7422A47A8E4A}"/>
     </a:ext>
   </a:extLst>
 </a:theme>

</xml_diff>